<commit_message>
Ueberarbeitung und IDs eingefuegt
</commit_message>
<xml_diff>
--- a/Meilensteine.pptx
+++ b/Meilensteine.pptx
@@ -979,7 +979,7 @@
         <a:p>
           <a:r>
             <a:rPr lang="de-DE" dirty="0" smtClean="0"/>
-            <a:t>Management</a:t>
+            <a:t>1. Management</a:t>
           </a:r>
           <a:endParaRPr lang="de-DE" dirty="0"/>
         </a:p>
@@ -1016,7 +1016,7 @@
         <a:p>
           <a:r>
             <a:rPr lang="de-DE" dirty="0" smtClean="0"/>
-            <a:t>Planung</a:t>
+            <a:t>1.1 Planung</a:t>
           </a:r>
           <a:endParaRPr lang="de-DE" dirty="0"/>
         </a:p>
@@ -1053,7 +1053,7 @@
         <a:p>
           <a:r>
             <a:rPr lang="de-DE" dirty="0" smtClean="0"/>
-            <a:t>Kontrolle</a:t>
+            <a:t>1.2 Kontrolle</a:t>
           </a:r>
           <a:endParaRPr lang="de-DE" dirty="0"/>
         </a:p>
@@ -1090,7 +1090,7 @@
         <a:p>
           <a:r>
             <a:rPr lang="de-DE" dirty="0" smtClean="0"/>
-            <a:t>Anforderungen</a:t>
+            <a:t>2. Anforderungen</a:t>
           </a:r>
           <a:endParaRPr lang="de-DE" dirty="0"/>
         </a:p>
@@ -1127,7 +1127,7 @@
         <a:p>
           <a:r>
             <a:rPr lang="de-DE" dirty="0" smtClean="0"/>
-            <a:t>Dokumentation</a:t>
+            <a:t>2.1 Dokumentation</a:t>
           </a:r>
           <a:endParaRPr lang="de-DE" dirty="0"/>
         </a:p>
@@ -1164,7 +1164,7 @@
         <a:p>
           <a:r>
             <a:rPr lang="de-DE" dirty="0" smtClean="0"/>
-            <a:t>Entwicklung</a:t>
+            <a:t>3. Entwicklung</a:t>
           </a:r>
           <a:endParaRPr lang="de-DE" dirty="0"/>
         </a:p>
@@ -1201,7 +1201,7 @@
         <a:p>
           <a:r>
             <a:rPr lang="de-DE" dirty="0" smtClean="0"/>
-            <a:t>Tests</a:t>
+            <a:t>4. Tests</a:t>
           </a:r>
           <a:endParaRPr lang="de-DE" dirty="0"/>
         </a:p>
@@ -1238,7 +1238,7 @@
         <a:p>
           <a:r>
             <a:rPr lang="de-DE" dirty="0" smtClean="0"/>
-            <a:t>App</a:t>
+            <a:t>2.2 App</a:t>
           </a:r>
           <a:endParaRPr lang="de-DE" dirty="0"/>
         </a:p>
@@ -1275,7 +1275,7 @@
         <a:p>
           <a:r>
             <a:rPr lang="de-DE" dirty="0" smtClean="0"/>
-            <a:t>GPS</a:t>
+            <a:t>2.2.1 GPS</a:t>
           </a:r>
           <a:endParaRPr lang="de-DE" dirty="0"/>
         </a:p>
@@ -1312,7 +1312,7 @@
         <a:p>
           <a:r>
             <a:rPr lang="de-DE" dirty="0" smtClean="0"/>
-            <a:t>Inhalt</a:t>
+            <a:t>2.2.1 Inhalt</a:t>
           </a:r>
           <a:endParaRPr lang="de-DE" dirty="0"/>
         </a:p>
@@ -1349,7 +1349,7 @@
         <a:p>
           <a:r>
             <a:rPr lang="de-DE" dirty="0" smtClean="0"/>
-            <a:t>App</a:t>
+            <a:t>3.1 App</a:t>
           </a:r>
           <a:endParaRPr lang="de-DE" dirty="0"/>
         </a:p>
@@ -1386,7 +1386,11 @@
         <a:p>
           <a:r>
             <a:rPr lang="de-DE" dirty="0" smtClean="0"/>
-            <a:t>API Verwendung</a:t>
+            <a:t>3.1.1 API </a:t>
+          </a:r>
+          <a:r>
+            <a:rPr lang="de-DE" dirty="0" smtClean="0"/>
+            <a:t>Verwendung</a:t>
           </a:r>
           <a:endParaRPr lang="de-DE" dirty="0"/>
         </a:p>
@@ -1423,7 +1427,7 @@
         <a:p>
           <a:r>
             <a:rPr lang="de-DE" dirty="0" smtClean="0"/>
-            <a:t>GUI</a:t>
+            <a:t>3.1.2 GUI</a:t>
           </a:r>
           <a:endParaRPr lang="de-DE" dirty="0"/>
         </a:p>
@@ -1460,7 +1464,11 @@
         <a:p>
           <a:r>
             <a:rPr lang="de-DE" dirty="0" smtClean="0"/>
-            <a:t>Standort erfassen</a:t>
+            <a:t>3.1.3 Standort </a:t>
+          </a:r>
+          <a:r>
+            <a:rPr lang="de-DE" dirty="0" smtClean="0"/>
+            <a:t>erfassen</a:t>
           </a:r>
           <a:endParaRPr lang="de-DE" dirty="0"/>
         </a:p>
@@ -1497,7 +1505,7 @@
         <a:p>
           <a:r>
             <a:rPr lang="de-DE" dirty="0" smtClean="0"/>
-            <a:t>Inhalte</a:t>
+            <a:t>3.2 Inhalte</a:t>
           </a:r>
           <a:endParaRPr lang="de-DE" dirty="0"/>
         </a:p>
@@ -1534,7 +1542,7 @@
         <a:p>
           <a:r>
             <a:rPr lang="de-DE" dirty="0" smtClean="0"/>
-            <a:t>Bereitstellen</a:t>
+            <a:t>3.2.1 Bereitstellen</a:t>
           </a:r>
           <a:endParaRPr lang="de-DE" dirty="0"/>
         </a:p>
@@ -1571,7 +1579,7 @@
         <a:p>
           <a:r>
             <a:rPr lang="de-DE" dirty="0" smtClean="0"/>
-            <a:t>Route</a:t>
+            <a:t>3.2.2 Route</a:t>
           </a:r>
           <a:endParaRPr lang="de-DE" dirty="0"/>
         </a:p>
@@ -1608,7 +1616,7 @@
         <a:p>
           <a:r>
             <a:rPr lang="de-DE" dirty="0" smtClean="0"/>
-            <a:t>Software</a:t>
+            <a:t>4.1 Software</a:t>
           </a:r>
           <a:endParaRPr lang="de-DE" dirty="0"/>
         </a:p>
@@ -1645,7 +1653,7 @@
         <a:p>
           <a:r>
             <a:rPr lang="de-DE" dirty="0" smtClean="0"/>
-            <a:t>Touren</a:t>
+            <a:t>4.2 Touren</a:t>
           </a:r>
           <a:endParaRPr lang="de-DE" dirty="0"/>
         </a:p>
@@ -1682,7 +1690,7 @@
         <a:p>
           <a:r>
             <a:rPr lang="de-DE" dirty="0" smtClean="0"/>
-            <a:t>Release</a:t>
+            <a:t>5. Release</a:t>
           </a:r>
           <a:endParaRPr lang="de-DE" dirty="0"/>
         </a:p>
@@ -1719,7 +1727,7 @@
         <a:p>
           <a:r>
             <a:rPr lang="de-DE" dirty="0" smtClean="0"/>
-            <a:t>Übergabe</a:t>
+            <a:t>5.1 Übergabe</a:t>
           </a:r>
           <a:endParaRPr lang="de-DE" dirty="0"/>
         </a:p>
@@ -1728,10 +1736,24 @@
     <dgm:pt modelId="{3F2A56FE-F1F3-4B58-A8E4-6A6FF3C12065}" type="parTrans" cxnId="{F3A46E32-D761-40C2-B0EA-7291D6D35642}">
       <dgm:prSet/>
       <dgm:spPr/>
+      <dgm:t>
+        <a:bodyPr/>
+        <a:lstStyle/>
+        <a:p>
+          <a:endParaRPr lang="de-DE"/>
+        </a:p>
+      </dgm:t>
     </dgm:pt>
     <dgm:pt modelId="{DEB770E0-3D0E-45A5-95A4-5D65E42BA39F}" type="sibTrans" cxnId="{F3A46E32-D761-40C2-B0EA-7291D6D35642}">
       <dgm:prSet/>
       <dgm:spPr/>
+      <dgm:t>
+        <a:bodyPr/>
+        <a:lstStyle/>
+        <a:p>
+          <a:endParaRPr lang="de-DE"/>
+        </a:p>
+      </dgm:t>
     </dgm:pt>
     <dgm:pt modelId="{9D320C81-0A74-4E83-9A78-EDE402268EA2}">
       <dgm:prSet phldrT="[Text]"/>
@@ -1742,7 +1764,7 @@
         <a:p>
           <a:r>
             <a:rPr lang="de-DE" dirty="0" smtClean="0"/>
-            <a:t>Veröffentlichung</a:t>
+            <a:t>5.2 Veröffentlichung</a:t>
           </a:r>
           <a:endParaRPr lang="de-DE" dirty="0"/>
         </a:p>
@@ -1751,10 +1773,24 @@
     <dgm:pt modelId="{7E029FC5-0B45-4201-9BBC-FB6C44F05368}" type="parTrans" cxnId="{5D0D2F16-3D63-4AFA-BBFE-4BA6DC8E3AC0}">
       <dgm:prSet/>
       <dgm:spPr/>
+      <dgm:t>
+        <a:bodyPr/>
+        <a:lstStyle/>
+        <a:p>
+          <a:endParaRPr lang="de-DE"/>
+        </a:p>
+      </dgm:t>
     </dgm:pt>
     <dgm:pt modelId="{5B678CCF-84DA-4A15-9790-D90C01312BF4}" type="sibTrans" cxnId="{5D0D2F16-3D63-4AFA-BBFE-4BA6DC8E3AC0}">
       <dgm:prSet/>
       <dgm:spPr/>
+      <dgm:t>
+        <a:bodyPr/>
+        <a:lstStyle/>
+        <a:p>
+          <a:endParaRPr lang="de-DE"/>
+        </a:p>
+      </dgm:t>
     </dgm:pt>
     <dgm:pt modelId="{B6F79879-3595-4E55-B58D-6113B02CD8E8}" type="pres">
       <dgm:prSet presAssocID="{5F27BC77-8941-43F4-8B90-FB3B05823CAC}" presName="hierChild1" presStyleCnt="0">
@@ -3064,98 +3100,98 @@
     </dgm:pt>
   </dgm:ptLst>
   <dgm:cxnLst>
+    <dgm:cxn modelId="{1A14DDAD-8272-4E91-92A2-6FA1021F64E7}" type="presOf" srcId="{A3D2CFEB-E623-4534-ADF8-DB2132888CFF}" destId="{8B5ADAD1-6A48-4917-ACF8-1E93A1E2A654}" srcOrd="1" destOrd="0" presId="urn:microsoft.com/office/officeart/2005/8/layout/orgChart1"/>
+    <dgm:cxn modelId="{631AF3FD-A246-4ECB-83D9-3DDE5E4278B2}" srcId="{DA23096C-C503-4079-9651-0120D7DFD8FB}" destId="{A3D2CFEB-E623-4534-ADF8-DB2132888CFF}" srcOrd="1" destOrd="0" parTransId="{D452F109-5781-45E9-8B00-AF4D270F3020}" sibTransId="{C92DF03B-22AC-423C-814F-36762F5A1B0F}"/>
+    <dgm:cxn modelId="{0111E53A-F125-4024-91D8-A2EE082E4AA0}" type="presOf" srcId="{0B361A93-DC8B-43E9-9E58-435B18AFC9B2}" destId="{DC2E5D02-8D5B-489E-92B8-769C86A6A212}" srcOrd="0" destOrd="0" presId="urn:microsoft.com/office/officeart/2005/8/layout/orgChart1"/>
+    <dgm:cxn modelId="{811DF587-E783-4D60-A76B-ADFBBD7DAC45}" type="presOf" srcId="{270BEE6F-2C56-4827-9E7A-D9E89357073A}" destId="{0936718E-CEEA-4408-9F23-2080F361579F}" srcOrd="0" destOrd="0" presId="urn:microsoft.com/office/officeart/2005/8/layout/orgChart1"/>
+    <dgm:cxn modelId="{04C6CE32-EFD4-434F-8571-B87BE2ACB9CE}" type="presOf" srcId="{2502981D-B508-4D00-BBE3-C266A648905B}" destId="{1B1CDD48-3727-404A-A7F2-A7C163EFA9B4}" srcOrd="1" destOrd="0" presId="urn:microsoft.com/office/officeart/2005/8/layout/orgChart1"/>
+    <dgm:cxn modelId="{781C4749-9912-48CE-BD8C-1C77707F3F93}" type="presOf" srcId="{9D320C81-0A74-4E83-9A78-EDE402268EA2}" destId="{CA5B0725-412D-430C-AD19-F662C982586F}" srcOrd="0" destOrd="0" presId="urn:microsoft.com/office/officeart/2005/8/layout/orgChart1"/>
+    <dgm:cxn modelId="{F7797B2A-125B-4C0B-A0DB-B8437AE07347}" srcId="{5F27BC77-8941-43F4-8B90-FB3B05823CAC}" destId="{2018ECA3-3A50-4106-AD7A-B731246A7598}" srcOrd="0" destOrd="0" parTransId="{93CCB537-67DE-4CC6-8D9A-856EDB5572C9}" sibTransId="{EEB4D02B-1A50-4631-B303-68850DFE97D9}"/>
+    <dgm:cxn modelId="{3C4A128B-6933-4B54-A176-49B19B4D19B5}" srcId="{24A9F61A-F705-4899-85B6-BE7BEA938049}" destId="{FDDA1B6B-1D57-4249-BFEA-C1F357D8F7DB}" srcOrd="0" destOrd="0" parTransId="{8AD0676E-5553-460D-B309-99833FC441A9}" sibTransId="{35E4DF9E-A722-48D1-ABB0-F242726577EE}"/>
+    <dgm:cxn modelId="{C15AB236-BD29-49A2-A73D-E51060745BC9}" type="presOf" srcId="{9F0B79EA-3A30-448C-90A2-15B8E9112023}" destId="{60B23CFF-F02E-4461-AAFB-9778B1658DF2}" srcOrd="1" destOrd="0" presId="urn:microsoft.com/office/officeart/2005/8/layout/orgChart1"/>
+    <dgm:cxn modelId="{C31259B2-8F09-4813-8603-127CAC5BA1F4}" type="presOf" srcId="{FEA03D8D-E2A3-446C-8872-F4EF7675901C}" destId="{2635FAE6-A136-440B-94EE-CD567052726F}" srcOrd="0" destOrd="0" presId="urn:microsoft.com/office/officeart/2005/8/layout/orgChart1"/>
+    <dgm:cxn modelId="{A17DA96F-C559-475C-BE27-FE8646F28698}" type="presOf" srcId="{02223512-5C62-4EE0-AA42-DE6D4435D584}" destId="{6A3AAAAC-3DFF-43F8-8209-3D0095E6D75A}" srcOrd="0" destOrd="0" presId="urn:microsoft.com/office/officeart/2005/8/layout/orgChart1"/>
+    <dgm:cxn modelId="{1CE9031A-0783-4A20-B18F-2D5F8E8B423F}" srcId="{35F2F850-E107-4C77-8C9D-F91B243DC4A5}" destId="{085AFD13-7F14-47B7-B76D-A7F6AA6D7212}" srcOrd="0" destOrd="0" parTransId="{87C6722B-8411-4627-88ED-F20025A38A56}" sibTransId="{D934D5F9-9223-4490-A537-0C0B68174B19}"/>
+    <dgm:cxn modelId="{81EE1E1C-72CD-47F9-9ECB-D58978B3F592}" type="presOf" srcId="{1A2BC42C-D917-47BA-9892-2A98BFAD301C}" destId="{CFB5BC9A-3731-456B-9D76-4EE628132314}" srcOrd="1" destOrd="0" presId="urn:microsoft.com/office/officeart/2005/8/layout/orgChart1"/>
+    <dgm:cxn modelId="{BB5A7476-A1FD-41BA-B6AA-A448089510D3}" type="presOf" srcId="{C65A0A47-1744-428E-A2CA-26F846199C1C}" destId="{7E1259E6-9B91-4841-A55A-80511B9ACB54}" srcOrd="1" destOrd="0" presId="urn:microsoft.com/office/officeart/2005/8/layout/orgChart1"/>
+    <dgm:cxn modelId="{D893047D-9855-4DA6-9FA3-AA77B4095214}" type="presOf" srcId="{7E029FC5-0B45-4201-9BBC-FB6C44F05368}" destId="{562C605B-7DD0-4B03-9063-F50EE92E1CA5}" srcOrd="0" destOrd="0" presId="urn:microsoft.com/office/officeart/2005/8/layout/orgChart1"/>
+    <dgm:cxn modelId="{658CB509-02F2-4814-9D27-A43D9BEC4F92}" srcId="{9F0B79EA-3A30-448C-90A2-15B8E9112023}" destId="{35F2F850-E107-4C77-8C9D-F91B243DC4A5}" srcOrd="1" destOrd="0" parTransId="{2DCF58DD-E3D0-4E43-9D60-E17E6BC34C3E}" sibTransId="{33DFDB88-B597-4516-B152-EA9E667C9F60}"/>
+    <dgm:cxn modelId="{E889756A-0E8E-4804-AA02-515F8981569A}" type="presOf" srcId="{085AFD13-7F14-47B7-B76D-A7F6AA6D7212}" destId="{1A350C2A-05E7-447D-A367-A20852E33E48}" srcOrd="0" destOrd="0" presId="urn:microsoft.com/office/officeart/2005/8/layout/orgChart1"/>
+    <dgm:cxn modelId="{5D0D2F16-3D63-4AFA-BBFE-4BA6DC8E3AC0}" srcId="{7DD12802-E74A-4097-86D1-028A7F959A05}" destId="{9D320C81-0A74-4E83-9A78-EDE402268EA2}" srcOrd="1" destOrd="0" parTransId="{7E029FC5-0B45-4201-9BBC-FB6C44F05368}" sibTransId="{5B678CCF-84DA-4A15-9790-D90C01312BF4}"/>
+    <dgm:cxn modelId="{C2D12244-3239-4E64-9507-0BB88FB63ACD}" type="presOf" srcId="{0520B758-E43F-43DC-8B3F-027FD277C58B}" destId="{83E75304-9D64-4ED0-A8F2-C2AD90D882CF}" srcOrd="1" destOrd="0" presId="urn:microsoft.com/office/officeart/2005/8/layout/orgChart1"/>
+    <dgm:cxn modelId="{56F81063-38ED-4965-A44F-90995047F453}" srcId="{2018ECA3-3A50-4106-AD7A-B731246A7598}" destId="{9F0B79EA-3A30-448C-90A2-15B8E9112023}" srcOrd="1" destOrd="0" parTransId="{81A8F166-AF98-495B-AFD5-4B70C9FEEB93}" sibTransId="{85E8328E-F519-4D47-AC71-E81378C096CD}"/>
+    <dgm:cxn modelId="{B422971E-6C3F-44B4-9659-C0B3B6EA0CAA}" type="presOf" srcId="{085AFD13-7F14-47B7-B76D-A7F6AA6D7212}" destId="{46D53ED0-223E-4775-9DAF-03CE5C37E983}" srcOrd="1" destOrd="0" presId="urn:microsoft.com/office/officeart/2005/8/layout/orgChart1"/>
+    <dgm:cxn modelId="{F26DDDEC-41D1-4218-B4B3-80AB5FDE31E2}" type="presOf" srcId="{91CA89EE-BC4A-4834-B60F-925408B98746}" destId="{4013B4B6-4487-4BA1-A2D2-3518FC17178F}" srcOrd="0" destOrd="0" presId="urn:microsoft.com/office/officeart/2005/8/layout/orgChart1"/>
+    <dgm:cxn modelId="{7ED9A2EB-562E-4BDE-81B6-73AE8DEF1990}" srcId="{2018ECA3-3A50-4106-AD7A-B731246A7598}" destId="{0520B758-E43F-43DC-8B3F-027FD277C58B}" srcOrd="2" destOrd="0" parTransId="{1199739B-BFE7-4EDE-9E9F-B924D03D7AC9}" sibTransId="{F5747C06-BE1D-44A1-B345-4736545CF320}"/>
+    <dgm:cxn modelId="{A637F482-39DD-4470-9BDC-05909EBA9DFB}" srcId="{24A9F61A-F705-4899-85B6-BE7BEA938049}" destId="{238AF202-FC15-4185-BFB0-CA07D2C4F3F9}" srcOrd="2" destOrd="0" parTransId="{91CA89EE-BC4A-4834-B60F-925408B98746}" sibTransId="{A936A088-6ED9-4ED9-BEC6-BF1B1EF5E5DF}"/>
+    <dgm:cxn modelId="{322E983C-B738-4DBB-A459-7C48BBB8DD1A}" srcId="{2502981D-B508-4D00-BBE3-C266A648905B}" destId="{BF228FAE-E2F9-4440-A067-75BC2D09439E}" srcOrd="0" destOrd="0" parTransId="{CC19FE3F-C17B-470C-A3B0-EB551EE659BD}" sibTransId="{EBBE59DE-AB61-44BB-9CD9-D5787C473FB3}"/>
+    <dgm:cxn modelId="{201CA1C3-EF9B-4F78-9C4D-E4E53240F309}" srcId="{35F2F850-E107-4C77-8C9D-F91B243DC4A5}" destId="{9649AF04-732C-4AFA-88F7-8FC2C53116FF}" srcOrd="1" destOrd="0" parTransId="{03CB0662-E879-4F8D-8F23-6182AFD1D0F2}" sibTransId="{F8C90F7B-6D0A-4EDA-A38E-9BE775B32392}"/>
+    <dgm:cxn modelId="{4294F149-73D0-46CD-BEE1-6CDCB66FD098}" srcId="{2502981D-B508-4D00-BBE3-C266A648905B}" destId="{F2A070D0-90DC-4710-9AF5-B06B5662AEA6}" srcOrd="1" destOrd="0" parTransId="{0B361A93-DC8B-43E9-9E58-435B18AFC9B2}" sibTransId="{D9D9AC85-EB10-48A2-BB10-5C819A97DE84}"/>
+    <dgm:cxn modelId="{AED80F1F-482E-4CA1-9278-9683025FB3D2}" type="presOf" srcId="{2DCF58DD-E3D0-4E43-9D60-E17E6BC34C3E}" destId="{2D2F53EB-A352-4924-8B99-8D078D24C7EA}" srcOrd="0" destOrd="0" presId="urn:microsoft.com/office/officeart/2005/8/layout/orgChart1"/>
+    <dgm:cxn modelId="{E26C256C-E267-469B-A9BD-047053ACA934}" type="presOf" srcId="{B4CD55CE-5A64-4000-9BDC-B03F47603D86}" destId="{5E69BB79-7E02-4BAB-9583-D3921136B6A3}" srcOrd="1" destOrd="0" presId="urn:microsoft.com/office/officeart/2005/8/layout/orgChart1"/>
+    <dgm:cxn modelId="{5250407C-D23B-4BD4-A19D-9BD02DCCBB1E}" srcId="{DA23096C-C503-4079-9651-0120D7DFD8FB}" destId="{B4CD55CE-5A64-4000-9BDC-B03F47603D86}" srcOrd="0" destOrd="0" parTransId="{FEA03D8D-E2A3-446C-8872-F4EF7675901C}" sibTransId="{33FCC0AA-CB6D-4F6F-9CCB-872253B5A16B}"/>
+    <dgm:cxn modelId="{85206848-C804-4BA3-9671-3125AF0D8244}" type="presOf" srcId="{9F0B79EA-3A30-448C-90A2-15B8E9112023}" destId="{0D2350D7-2FC9-4757-8FB8-DAF4285B6035}" srcOrd="0" destOrd="0" presId="urn:microsoft.com/office/officeart/2005/8/layout/orgChart1"/>
+    <dgm:cxn modelId="{AC5955BC-4831-4B78-8C2B-13C51ABC9584}" type="presOf" srcId="{CC19FE3F-C17B-470C-A3B0-EB551EE659BD}" destId="{36755ADB-4774-42F4-B5DF-685D738A5BC8}" srcOrd="0" destOrd="0" presId="urn:microsoft.com/office/officeart/2005/8/layout/orgChart1"/>
+    <dgm:cxn modelId="{BCD3C035-DB26-47F1-8741-A74106EB1162}" type="presOf" srcId="{A0A88FD2-0664-4A56-BE63-946D5533CF07}" destId="{7A49B742-3638-49B3-A71F-D6A49A18C5F1}" srcOrd="0" destOrd="0" presId="urn:microsoft.com/office/officeart/2005/8/layout/orgChart1"/>
+    <dgm:cxn modelId="{0734FB30-C88D-48DF-8A55-8F2FA11CD7D7}" type="presOf" srcId="{81A8F166-AF98-495B-AFD5-4B70C9FEEB93}" destId="{989FA015-F7E7-4C0D-9F5B-8CEF27A60918}" srcOrd="0" destOrd="0" presId="urn:microsoft.com/office/officeart/2005/8/layout/orgChart1"/>
+    <dgm:cxn modelId="{0B05A31D-F65E-4E1E-860D-60A12A4321D4}" srcId="{0520B758-E43F-43DC-8B3F-027FD277C58B}" destId="{2502981D-B508-4D00-BBE3-C266A648905B}" srcOrd="1" destOrd="0" parTransId="{A0A88FD2-0664-4A56-BE63-946D5533CF07}" sibTransId="{F69F2A0E-4AF0-422E-AFAC-2B8C277D4922}"/>
+    <dgm:cxn modelId="{F267F84B-1FA7-4E62-ABEC-812E311D6414}" type="presOf" srcId="{F2A070D0-90DC-4710-9AF5-B06B5662AEA6}" destId="{002116D8-3FBF-45CD-850E-4D9F16A63BA2}" srcOrd="1" destOrd="0" presId="urn:microsoft.com/office/officeart/2005/8/layout/orgChart1"/>
+    <dgm:cxn modelId="{EE970E6C-4262-405F-840E-165E6479255F}" type="presOf" srcId="{35F2F850-E107-4C77-8C9D-F91B243DC4A5}" destId="{F8718B6D-A3A0-4C07-B15E-4D6AA2E80E21}" srcOrd="0" destOrd="0" presId="urn:microsoft.com/office/officeart/2005/8/layout/orgChart1"/>
+    <dgm:cxn modelId="{8A686676-A482-46E6-8351-4D8B74773777}" type="presOf" srcId="{C65A0A47-1744-428E-A2CA-26F846199C1C}" destId="{1575D451-D673-4424-AE4D-AB209AF5EC81}" srcOrd="0" destOrd="0" presId="urn:microsoft.com/office/officeart/2005/8/layout/orgChart1"/>
+    <dgm:cxn modelId="{B9A1AC47-1563-4EA2-8C6A-1AF6AD3C9D0A}" srcId="{24A9F61A-F705-4899-85B6-BE7BEA938049}" destId="{270BEE6F-2C56-4827-9E7A-D9E89357073A}" srcOrd="1" destOrd="0" parTransId="{EF96740E-451F-4D50-A83B-D8B9E2184D46}" sibTransId="{D0ACCEE7-795C-46DE-90E9-F964D1CD0259}"/>
+    <dgm:cxn modelId="{F96E68CC-2A40-4FB0-BE9A-FBDBC5B9FC3E}" type="presOf" srcId="{3F2A56FE-F1F3-4B58-A8E4-6A6FF3C12065}" destId="{1C0336C7-1C3B-4EC3-A39C-A32229FEE91F}" srcOrd="0" destOrd="0" presId="urn:microsoft.com/office/officeart/2005/8/layout/orgChart1"/>
+    <dgm:cxn modelId="{0262AF80-CE15-43E0-9E9E-A30B4E447467}" type="presOf" srcId="{5CC81FDE-3B98-4B95-AD39-89E4A4F2D92D}" destId="{781DFCE4-43A1-43B6-9B54-DDC2B388E18A}" srcOrd="1" destOrd="0" presId="urn:microsoft.com/office/officeart/2005/8/layout/orgChart1"/>
+    <dgm:cxn modelId="{0FC609F1-AAC4-4FAF-9B3B-41F5C2F8D3C0}" type="presOf" srcId="{24A9F61A-F705-4899-85B6-BE7BEA938049}" destId="{FE964393-FF24-4F12-9E04-C5AC74F5291E}" srcOrd="1" destOrd="0" presId="urn:microsoft.com/office/officeart/2005/8/layout/orgChart1"/>
+    <dgm:cxn modelId="{0D2EE4F1-1378-49B8-B2C0-1218AB0F83BF}" type="presOf" srcId="{270BEE6F-2C56-4827-9E7A-D9E89357073A}" destId="{5B933681-DE6A-4935-82A7-0509A910A9A4}" srcOrd="1" destOrd="0" presId="urn:microsoft.com/office/officeart/2005/8/layout/orgChart1"/>
+    <dgm:cxn modelId="{A1938B66-2A80-453F-ADE4-A9CC9A3FF95E}" type="presOf" srcId="{7DD12802-E74A-4097-86D1-028A7F959A05}" destId="{E979CEFB-882A-43F6-B0D1-C6E4CD22FE8F}" srcOrd="1" destOrd="0" presId="urn:microsoft.com/office/officeart/2005/8/layout/orgChart1"/>
+    <dgm:cxn modelId="{2C58A8E4-8AC3-4D93-9DE0-2FE5D74EA321}" type="presOf" srcId="{03CB0662-E879-4F8D-8F23-6182AFD1D0F2}" destId="{A3259B1B-DB33-4D5F-8977-A5F3077C258A}" srcOrd="0" destOrd="0" presId="urn:microsoft.com/office/officeart/2005/8/layout/orgChart1"/>
+    <dgm:cxn modelId="{1A60EF39-94CD-4388-8DF2-838118942B05}" type="presOf" srcId="{A3D2CFEB-E623-4534-ADF8-DB2132888CFF}" destId="{AD606730-8D94-4FAE-84AB-6C0CC4496D5D}" srcOrd="0" destOrd="0" presId="urn:microsoft.com/office/officeart/2005/8/layout/orgChart1"/>
+    <dgm:cxn modelId="{AF7475BA-5B53-4E11-9F86-DF91C4C12249}" type="presOf" srcId="{2018ECA3-3A50-4106-AD7A-B731246A7598}" destId="{1058AA14-F65C-440C-AFE3-B314A177C29A}" srcOrd="0" destOrd="0" presId="urn:microsoft.com/office/officeart/2005/8/layout/orgChart1"/>
     <dgm:cxn modelId="{4D5F7AE8-51F1-41DB-AAD4-EED2643B49FB}" type="presOf" srcId="{35F2F850-E107-4C77-8C9D-F91B243DC4A5}" destId="{AF007662-F341-4510-BF09-E05402B91184}" srcOrd="1" destOrd="0" presId="urn:microsoft.com/office/officeart/2005/8/layout/orgChart1"/>
+    <dgm:cxn modelId="{8A6F1D29-16C7-43E0-8D6C-2B6FD7830F73}" type="presOf" srcId="{8AD0676E-5553-460D-B309-99833FC441A9}" destId="{89A51EBE-9714-4FEA-8270-2B8A9D36AEBA}" srcOrd="0" destOrd="0" presId="urn:microsoft.com/office/officeart/2005/8/layout/orgChart1"/>
+    <dgm:cxn modelId="{8E029C15-A586-49EA-A17C-C1630F12BD28}" type="presOf" srcId="{238AF202-FC15-4185-BFB0-CA07D2C4F3F9}" destId="{3ACE5AC5-CCF3-4813-86F3-CA9684BFDAE6}" srcOrd="1" destOrd="0" presId="urn:microsoft.com/office/officeart/2005/8/layout/orgChart1"/>
+    <dgm:cxn modelId="{04C776B0-ED38-49D3-BD98-FB67A64DF6A6}" type="presOf" srcId="{7DD12802-E74A-4097-86D1-028A7F959A05}" destId="{602B28CD-9751-402D-B38A-9208699B88B9}" srcOrd="0" destOrd="0" presId="urn:microsoft.com/office/officeart/2005/8/layout/orgChart1"/>
     <dgm:cxn modelId="{10B4C848-3F32-4893-81A6-DA12E261A7C0}" type="presOf" srcId="{BF228FAE-E2F9-4440-A067-75BC2D09439E}" destId="{7625274D-FF50-41DF-84DB-11BC22C45A36}" srcOrd="1" destOrd="0" presId="urn:microsoft.com/office/officeart/2005/8/layout/orgChart1"/>
-    <dgm:cxn modelId="{0FC609F1-AAC4-4FAF-9B3B-41F5C2F8D3C0}" type="presOf" srcId="{24A9F61A-F705-4899-85B6-BE7BEA938049}" destId="{FE964393-FF24-4F12-9E04-C5AC74F5291E}" srcOrd="1" destOrd="0" presId="urn:microsoft.com/office/officeart/2005/8/layout/orgChart1"/>
-    <dgm:cxn modelId="{0262AF80-CE15-43E0-9E9E-A30B4E447467}" type="presOf" srcId="{5CC81FDE-3B98-4B95-AD39-89E4A4F2D92D}" destId="{781DFCE4-43A1-43B6-9B54-DDC2B388E18A}" srcOrd="1" destOrd="0" presId="urn:microsoft.com/office/officeart/2005/8/layout/orgChart1"/>
-    <dgm:cxn modelId="{56F81063-38ED-4965-A44F-90995047F453}" srcId="{2018ECA3-3A50-4106-AD7A-B731246A7598}" destId="{9F0B79EA-3A30-448C-90A2-15B8E9112023}" srcOrd="1" destOrd="0" parTransId="{81A8F166-AF98-495B-AFD5-4B70C9FEEB93}" sibTransId="{85E8328E-F519-4D47-AC71-E81378C096CD}"/>
-    <dgm:cxn modelId="{0734FB30-C88D-48DF-8A55-8F2FA11CD7D7}" type="presOf" srcId="{81A8F166-AF98-495B-AFD5-4B70C9FEEB93}" destId="{989FA015-F7E7-4C0D-9F5B-8CEF27A60918}" srcOrd="0" destOrd="0" presId="urn:microsoft.com/office/officeart/2005/8/layout/orgChart1"/>
+    <dgm:cxn modelId="{6086D401-84F0-4B5E-8CF1-C7140967BB0C}" type="presOf" srcId="{D452F109-5781-45E9-8B00-AF4D270F3020}" destId="{AB95BCF8-91C6-4CC4-9159-EBAB7291A3AA}" srcOrd="0" destOrd="0" presId="urn:microsoft.com/office/officeart/2005/8/layout/orgChart1"/>
+    <dgm:cxn modelId="{44BFE925-9EB2-4F02-ACB9-851BC9E84561}" type="presOf" srcId="{87C6722B-8411-4627-88ED-F20025A38A56}" destId="{6D4EC7F1-CA82-432F-971D-3C7AA1308BF2}" srcOrd="0" destOrd="0" presId="urn:microsoft.com/office/officeart/2005/8/layout/orgChart1"/>
+    <dgm:cxn modelId="{5A49ED8D-BCB1-43CA-AC41-9E3FDBD9ABA8}" type="presOf" srcId="{EF96740E-451F-4D50-A83B-D8B9E2184D46}" destId="{7654533E-21FF-4056-AF83-E7A1A3DEF6CD}" srcOrd="0" destOrd="0" presId="urn:microsoft.com/office/officeart/2005/8/layout/orgChart1"/>
+    <dgm:cxn modelId="{EA6C5C9C-8093-43A5-A7DA-FB0BB57EF203}" type="presOf" srcId="{238AF202-FC15-4185-BFB0-CA07D2C4F3F9}" destId="{233E93EC-7755-4700-ABEF-527A5EB0BB0A}" srcOrd="0" destOrd="0" presId="urn:microsoft.com/office/officeart/2005/8/layout/orgChart1"/>
+    <dgm:cxn modelId="{5020BA93-3DC6-49F5-B2E9-F9F386EB175F}" type="presOf" srcId="{6BEC65C1-B5DA-4EA7-84AF-12402488F2FA}" destId="{2D4163EB-C95A-4803-87E5-AF71E21D9F0A}" srcOrd="1" destOrd="0" presId="urn:microsoft.com/office/officeart/2005/8/layout/orgChart1"/>
+    <dgm:cxn modelId="{8BCF3E7F-79F0-4840-9382-6490B5D65E69}" type="presOf" srcId="{2018ECA3-3A50-4106-AD7A-B731246A7598}" destId="{EDB2F9E9-0BB0-4A14-AE78-9ADE0DB7D7F9}" srcOrd="1" destOrd="0" presId="urn:microsoft.com/office/officeart/2005/8/layout/orgChart1"/>
+    <dgm:cxn modelId="{139A8D14-5574-461B-B3DA-991766D5F892}" srcId="{5CC81FDE-3B98-4B95-AD39-89E4A4F2D92D}" destId="{6BEC65C1-B5DA-4EA7-84AF-12402488F2FA}" srcOrd="1" destOrd="0" parTransId="{71383C8E-BA2F-4107-B6C7-08C92C51E575}" sibTransId="{FA040C3E-DFAC-4170-8A15-DD8397136B0D}"/>
+    <dgm:cxn modelId="{AD11DC8C-3D03-41CF-8DFA-6C34ABC19A52}" type="presOf" srcId="{0520B758-E43F-43DC-8B3F-027FD277C58B}" destId="{6D0C319E-23D6-43F1-B42A-A98526B61A96}" srcOrd="0" destOrd="0" presId="urn:microsoft.com/office/officeart/2005/8/layout/orgChart1"/>
+    <dgm:cxn modelId="{3A4FC1B0-FDCF-4494-B985-EA64C297FB80}" type="presOf" srcId="{B8722430-E04D-4FFD-BB4C-E90C8E6E9917}" destId="{8574B1D5-AB4E-4EA2-9BE4-CF4DA634B87C}" srcOrd="0" destOrd="0" presId="urn:microsoft.com/office/officeart/2005/8/layout/orgChart1"/>
+    <dgm:cxn modelId="{134BF836-08D0-4BBA-8708-D2BD8F59EC06}" type="presOf" srcId="{4B834CAB-818E-4F52-9286-EB6761DDC1AB}" destId="{EDA619DB-9D3D-445F-A1B6-8136A798A345}" srcOrd="0" destOrd="0" presId="urn:microsoft.com/office/officeart/2005/8/layout/orgChart1"/>
+    <dgm:cxn modelId="{41EFF8EB-97BC-4C22-B556-BCA7FF2C3850}" type="presOf" srcId="{DA23096C-C503-4079-9651-0120D7DFD8FB}" destId="{EC93B103-468E-4CBD-B903-F7F643BE1263}" srcOrd="1" destOrd="0" presId="urn:microsoft.com/office/officeart/2005/8/layout/orgChart1"/>
+    <dgm:cxn modelId="{2730FB3B-C3E9-452C-BCD4-3233C566F903}" type="presOf" srcId="{9735FA81-A365-4641-8F21-8EFA2F6CD387}" destId="{794C1402-FE47-41F6-A06E-0AB094AACC3A}" srcOrd="0" destOrd="0" presId="urn:microsoft.com/office/officeart/2005/8/layout/orgChart1"/>
+    <dgm:cxn modelId="{BA797577-CC54-430D-982D-24CEDEAFE85B}" type="presOf" srcId="{1A2BC42C-D917-47BA-9892-2A98BFAD301C}" destId="{D94E57F3-1295-403E-9BE0-48A7FD99AC72}" srcOrd="0" destOrd="0" presId="urn:microsoft.com/office/officeart/2005/8/layout/orgChart1"/>
+    <dgm:cxn modelId="{C807E77E-BB01-4AA8-97EF-1155F0B4E132}" type="presOf" srcId="{FDDA1B6B-1D57-4249-BFEA-C1F357D8F7DB}" destId="{D0D61E12-9153-48D3-A2FC-AA594E45FA03}" srcOrd="0" destOrd="0" presId="urn:microsoft.com/office/officeart/2005/8/layout/orgChart1"/>
+    <dgm:cxn modelId="{ABAFE405-3BAE-44CB-B26C-08ADD18C51D1}" type="presOf" srcId="{5CC81FDE-3B98-4B95-AD39-89E4A4F2D92D}" destId="{723EDBF7-BB25-40A8-9D84-FEC8BF62B464}" srcOrd="0" destOrd="0" presId="urn:microsoft.com/office/officeart/2005/8/layout/orgChart1"/>
+    <dgm:cxn modelId="{1965E8F4-2B4C-4348-95A8-843F71E9A6D9}" type="presOf" srcId="{B97417FE-BCBA-4F7E-B26B-114EB0A63CDD}" destId="{A639485A-B3DE-4FF7-8B8F-86421D00FFBF}" srcOrd="1" destOrd="0" presId="urn:microsoft.com/office/officeart/2005/8/layout/orgChart1"/>
+    <dgm:cxn modelId="{683B6AC8-E0DD-4FA2-9D37-3DCFFF522947}" type="presOf" srcId="{BF228FAE-E2F9-4440-A067-75BC2D09439E}" destId="{70CC56F8-3AC9-46BB-92F2-08916F5123B1}" srcOrd="0" destOrd="0" presId="urn:microsoft.com/office/officeart/2005/8/layout/orgChart1"/>
+    <dgm:cxn modelId="{E2D0A395-B9A4-44CF-8500-02E687AAFE9A}" type="presOf" srcId="{24A9F61A-F705-4899-85B6-BE7BEA938049}" destId="{8E128385-4E4F-4484-A4CF-529E679AEB44}" srcOrd="0" destOrd="0" presId="urn:microsoft.com/office/officeart/2005/8/layout/orgChart1"/>
+    <dgm:cxn modelId="{6BFEA5C1-4A14-479A-BFFD-1AB0299BF18C}" type="presOf" srcId="{9649AF04-732C-4AFA-88F7-8FC2C53116FF}" destId="{E1BABCF3-339D-4090-9CAF-29C1BCCD5CF0}" srcOrd="1" destOrd="0" presId="urn:microsoft.com/office/officeart/2005/8/layout/orgChart1"/>
+    <dgm:cxn modelId="{22AB0ACE-4294-414B-AAAF-798103133538}" type="presOf" srcId="{5EEA19EC-82E6-48A6-A9DF-5998351B73D7}" destId="{74337026-54A3-416F-BF29-2F2933D2B907}" srcOrd="0" destOrd="0" presId="urn:microsoft.com/office/officeart/2005/8/layout/orgChart1"/>
+    <dgm:cxn modelId="{816BE360-888F-4ED7-8E3C-573943B7B966}" type="presOf" srcId="{6BEC65C1-B5DA-4EA7-84AF-12402488F2FA}" destId="{2C4631C8-13A4-470E-8A9B-D904F220465A}" srcOrd="0" destOrd="0" presId="urn:microsoft.com/office/officeart/2005/8/layout/orgChart1"/>
+    <dgm:cxn modelId="{149407FE-0D4A-4984-8362-42F36C850602}" type="presOf" srcId="{9649AF04-732C-4AFA-88F7-8FC2C53116FF}" destId="{D7E127B8-2E5D-4A0F-976B-D3E8043E4C5B}" srcOrd="0" destOrd="0" presId="urn:microsoft.com/office/officeart/2005/8/layout/orgChart1"/>
+    <dgm:cxn modelId="{4C4C284A-53E7-4DD1-95AD-CA3120C66F92}" srcId="{2018ECA3-3A50-4106-AD7A-B731246A7598}" destId="{7DD12802-E74A-4097-86D1-028A7F959A05}" srcOrd="4" destOrd="0" parTransId="{41CD59CA-F9D8-4CA1-A04F-A4DA4627C1CC}" sibTransId="{9A5C4603-0D36-495A-AAAC-E1D21476B892}"/>
+    <dgm:cxn modelId="{93A07223-F3F9-4728-84D4-3A5000F40DF5}" type="presOf" srcId="{B97417FE-BCBA-4F7E-B26B-114EB0A63CDD}" destId="{E33D8E8D-3F33-46DC-8C84-D1C71321D732}" srcOrd="0" destOrd="0" presId="urn:microsoft.com/office/officeart/2005/8/layout/orgChart1"/>
+    <dgm:cxn modelId="{F045FD77-7054-4416-8E9F-6738C4D97703}" srcId="{9F0B79EA-3A30-448C-90A2-15B8E9112023}" destId="{C65A0A47-1744-428E-A2CA-26F846199C1C}" srcOrd="0" destOrd="0" parTransId="{B8722430-E04D-4FFD-BB4C-E90C8E6E9917}" sibTransId="{3AD53FA2-8DD5-4575-B835-08ED8439DE16}"/>
+    <dgm:cxn modelId="{D8E6A6F0-779F-461A-99B9-57DA6FB67477}" type="presOf" srcId="{5F27BC77-8941-43F4-8B90-FB3B05823CAC}" destId="{B6F79879-3595-4E55-B58D-6113B02CD8E8}" srcOrd="0" destOrd="0" presId="urn:microsoft.com/office/officeart/2005/8/layout/orgChart1"/>
+    <dgm:cxn modelId="{EF1CE36C-EBD8-4F94-8000-6B950C11FC85}" type="presOf" srcId="{71383C8E-BA2F-4107-B6C7-08C92C51E575}" destId="{394E97AD-5282-4D3C-851B-1739E18C3B22}" srcOrd="0" destOrd="0" presId="urn:microsoft.com/office/officeart/2005/8/layout/orgChart1"/>
+    <dgm:cxn modelId="{413F3A88-8B64-4AB9-95F4-45747A4F6EC3}" srcId="{0520B758-E43F-43DC-8B3F-027FD277C58B}" destId="{24A9F61A-F705-4899-85B6-BE7BEA938049}" srcOrd="0" destOrd="0" parTransId="{5EEA19EC-82E6-48A6-A9DF-5998351B73D7}" sibTransId="{FAB74B7E-CAA5-48DC-8963-3500579199D0}"/>
+    <dgm:cxn modelId="{DA442048-9214-422A-AD55-B62E4D42569A}" type="presOf" srcId="{DA23096C-C503-4079-9651-0120D7DFD8FB}" destId="{5A4A07DA-DC3F-4FB2-985A-69869BE7034F}" srcOrd="0" destOrd="0" presId="urn:microsoft.com/office/officeart/2005/8/layout/orgChart1"/>
+    <dgm:cxn modelId="{79C49F6B-DF60-4F7E-876D-8A0CBAA41E74}" type="presOf" srcId="{9D320C81-0A74-4E83-9A78-EDE402268EA2}" destId="{B0AD86AF-D4B7-47AA-A340-27CAC413D1EA}" srcOrd="1" destOrd="0" presId="urn:microsoft.com/office/officeart/2005/8/layout/orgChart1"/>
     <dgm:cxn modelId="{A5AA5415-F98B-4B0B-A4A8-B9FEE09AB379}" type="presOf" srcId="{2502981D-B508-4D00-BBE3-C266A648905B}" destId="{34D4E5E4-68CC-437A-86B7-1D596880EB2E}" srcOrd="0" destOrd="0" presId="urn:microsoft.com/office/officeart/2005/8/layout/orgChart1"/>
-    <dgm:cxn modelId="{658CB509-02F2-4814-9D27-A43D9BEC4F92}" srcId="{9F0B79EA-3A30-448C-90A2-15B8E9112023}" destId="{35F2F850-E107-4C77-8C9D-F91B243DC4A5}" srcOrd="1" destOrd="0" parTransId="{2DCF58DD-E3D0-4E43-9D60-E17E6BC34C3E}" sibTransId="{33DFDB88-B597-4516-B152-EA9E667C9F60}"/>
-    <dgm:cxn modelId="{81EE1E1C-72CD-47F9-9ECB-D58978B3F592}" type="presOf" srcId="{1A2BC42C-D917-47BA-9892-2A98BFAD301C}" destId="{CFB5BC9A-3731-456B-9D76-4EE628132314}" srcOrd="1" destOrd="0" presId="urn:microsoft.com/office/officeart/2005/8/layout/orgChart1"/>
-    <dgm:cxn modelId="{E889756A-0E8E-4804-AA02-515F8981569A}" type="presOf" srcId="{085AFD13-7F14-47B7-B76D-A7F6AA6D7212}" destId="{1A350C2A-05E7-447D-A367-A20852E33E48}" srcOrd="0" destOrd="0" presId="urn:microsoft.com/office/officeart/2005/8/layout/orgChart1"/>
+    <dgm:cxn modelId="{84BB7F5F-1052-4F7D-A3B4-CEDAC0F6F465}" type="presOf" srcId="{41CD59CA-F9D8-4CA1-A04F-A4DA4627C1CC}" destId="{722677F9-659F-4F19-B1A2-EF88290C73BD}" srcOrd="0" destOrd="0" presId="urn:microsoft.com/office/officeart/2005/8/layout/orgChart1"/>
+    <dgm:cxn modelId="{974AA234-1440-46D7-A175-2C8600FAF478}" type="presOf" srcId="{B4CD55CE-5A64-4000-9BDC-B03F47603D86}" destId="{4AF33755-706D-4315-B258-1F1C2070289F}" srcOrd="0" destOrd="0" presId="urn:microsoft.com/office/officeart/2005/8/layout/orgChart1"/>
+    <dgm:cxn modelId="{F41FAD95-67CD-4EAF-8833-F8E36085A659}" srcId="{5CC81FDE-3B98-4B95-AD39-89E4A4F2D92D}" destId="{B97417FE-BCBA-4F7E-B26B-114EB0A63CDD}" srcOrd="0" destOrd="0" parTransId="{9735FA81-A365-4641-8F21-8EFA2F6CD387}" sibTransId="{DD249135-6B6F-4BDF-91F4-210EB4E24F39}"/>
+    <dgm:cxn modelId="{64D9CC28-AA28-4624-BC4A-204A13F00EB9}" srcId="{2018ECA3-3A50-4106-AD7A-B731246A7598}" destId="{DA23096C-C503-4079-9651-0120D7DFD8FB}" srcOrd="0" destOrd="0" parTransId="{02223512-5C62-4EE0-AA42-DE6D4435D584}" sibTransId="{DCB456B7-4643-43C9-AFCC-5CAF68398CF8}"/>
+    <dgm:cxn modelId="{60AC721A-EEB5-4598-886A-ED978EE70EDC}" type="presOf" srcId="{F2A070D0-90DC-4710-9AF5-B06B5662AEA6}" destId="{DE55CCFF-0CB8-4F39-8009-B257196C6675}" srcOrd="0" destOrd="0" presId="urn:microsoft.com/office/officeart/2005/8/layout/orgChart1"/>
+    <dgm:cxn modelId="{F3A46E32-D761-40C2-B0EA-7291D6D35642}" srcId="{7DD12802-E74A-4097-86D1-028A7F959A05}" destId="{1A2BC42C-D917-47BA-9892-2A98BFAD301C}" srcOrd="0" destOrd="0" parTransId="{3F2A56FE-F1F3-4B58-A8E4-6A6FF3C12065}" sibTransId="{DEB770E0-3D0E-45A5-95A4-5D65E42BA39F}"/>
+    <dgm:cxn modelId="{BC3ABDA0-DE97-4DB0-A6E3-90C4F49BADE3}" srcId="{2018ECA3-3A50-4106-AD7A-B731246A7598}" destId="{5CC81FDE-3B98-4B95-AD39-89E4A4F2D92D}" srcOrd="3" destOrd="0" parTransId="{4B834CAB-818E-4F52-9286-EB6761DDC1AB}" sibTransId="{AC3861EB-AEC7-4851-A42D-4D3CC2A6AA7B}"/>
     <dgm:cxn modelId="{3525C27C-5AAE-4834-9C45-7E3B6AD5A52F}" type="presOf" srcId="{1199739B-BFE7-4EDE-9E9F-B924D03D7AC9}" destId="{5D798A56-5DCE-4375-B08A-9E5028C52174}" srcOrd="0" destOrd="0" presId="urn:microsoft.com/office/officeart/2005/8/layout/orgChart1"/>
-    <dgm:cxn modelId="{1CE9031A-0783-4A20-B18F-2D5F8E8B423F}" srcId="{35F2F850-E107-4C77-8C9D-F91B243DC4A5}" destId="{085AFD13-7F14-47B7-B76D-A7F6AA6D7212}" srcOrd="0" destOrd="0" parTransId="{87C6722B-8411-4627-88ED-F20025A38A56}" sibTransId="{D934D5F9-9223-4490-A537-0C0B68174B19}"/>
-    <dgm:cxn modelId="{E2D0A395-B9A4-44CF-8500-02E687AAFE9A}" type="presOf" srcId="{24A9F61A-F705-4899-85B6-BE7BEA938049}" destId="{8E128385-4E4F-4484-A4CF-529E679AEB44}" srcOrd="0" destOrd="0" presId="urn:microsoft.com/office/officeart/2005/8/layout/orgChart1"/>
-    <dgm:cxn modelId="{139A8D14-5574-461B-B3DA-991766D5F892}" srcId="{5CC81FDE-3B98-4B95-AD39-89E4A4F2D92D}" destId="{6BEC65C1-B5DA-4EA7-84AF-12402488F2FA}" srcOrd="1" destOrd="0" parTransId="{71383C8E-BA2F-4107-B6C7-08C92C51E575}" sibTransId="{FA040C3E-DFAC-4170-8A15-DD8397136B0D}"/>
-    <dgm:cxn modelId="{C807E77E-BB01-4AA8-97EF-1155F0B4E132}" type="presOf" srcId="{FDDA1B6B-1D57-4249-BFEA-C1F357D8F7DB}" destId="{D0D61E12-9153-48D3-A2FC-AA594E45FA03}" srcOrd="0" destOrd="0" presId="urn:microsoft.com/office/officeart/2005/8/layout/orgChart1"/>
-    <dgm:cxn modelId="{413F3A88-8B64-4AB9-95F4-45747A4F6EC3}" srcId="{0520B758-E43F-43DC-8B3F-027FD277C58B}" destId="{24A9F61A-F705-4899-85B6-BE7BEA938049}" srcOrd="0" destOrd="0" parTransId="{5EEA19EC-82E6-48A6-A9DF-5998351B73D7}" sibTransId="{FAB74B7E-CAA5-48DC-8963-3500579199D0}"/>
-    <dgm:cxn modelId="{974AA234-1440-46D7-A175-2C8600FAF478}" type="presOf" srcId="{B4CD55CE-5A64-4000-9BDC-B03F47603D86}" destId="{4AF33755-706D-4315-B258-1F1C2070289F}" srcOrd="0" destOrd="0" presId="urn:microsoft.com/office/officeart/2005/8/layout/orgChart1"/>
-    <dgm:cxn modelId="{F7797B2A-125B-4C0B-A0DB-B8437AE07347}" srcId="{5F27BC77-8941-43F4-8B90-FB3B05823CAC}" destId="{2018ECA3-3A50-4106-AD7A-B731246A7598}" srcOrd="0" destOrd="0" parTransId="{93CCB537-67DE-4CC6-8D9A-856EDB5572C9}" sibTransId="{EEB4D02B-1A50-4631-B303-68850DFE97D9}"/>
-    <dgm:cxn modelId="{84BB7F5F-1052-4F7D-A3B4-CEDAC0F6F465}" type="presOf" srcId="{41CD59CA-F9D8-4CA1-A04F-A4DA4627C1CC}" destId="{722677F9-659F-4F19-B1A2-EF88290C73BD}" srcOrd="0" destOrd="0" presId="urn:microsoft.com/office/officeart/2005/8/layout/orgChart1"/>
-    <dgm:cxn modelId="{0B05A31D-F65E-4E1E-860D-60A12A4321D4}" srcId="{0520B758-E43F-43DC-8B3F-027FD277C58B}" destId="{2502981D-B508-4D00-BBE3-C266A648905B}" srcOrd="1" destOrd="0" parTransId="{A0A88FD2-0664-4A56-BE63-946D5533CF07}" sibTransId="{F69F2A0E-4AF0-422E-AFAC-2B8C277D4922}"/>
-    <dgm:cxn modelId="{60AC721A-EEB5-4598-886A-ED978EE70EDC}" type="presOf" srcId="{F2A070D0-90DC-4710-9AF5-B06B5662AEA6}" destId="{DE55CCFF-0CB8-4F39-8009-B257196C6675}" srcOrd="0" destOrd="0" presId="urn:microsoft.com/office/officeart/2005/8/layout/orgChart1"/>
-    <dgm:cxn modelId="{2C58A8E4-8AC3-4D93-9DE0-2FE5D74EA321}" type="presOf" srcId="{03CB0662-E879-4F8D-8F23-6182AFD1D0F2}" destId="{A3259B1B-DB33-4D5F-8977-A5F3077C258A}" srcOrd="0" destOrd="0" presId="urn:microsoft.com/office/officeart/2005/8/layout/orgChart1"/>
-    <dgm:cxn modelId="{0D2EE4F1-1378-49B8-B2C0-1218AB0F83BF}" type="presOf" srcId="{270BEE6F-2C56-4827-9E7A-D9E89357073A}" destId="{5B933681-DE6A-4935-82A7-0509A910A9A4}" srcOrd="1" destOrd="0" presId="urn:microsoft.com/office/officeart/2005/8/layout/orgChart1"/>
-    <dgm:cxn modelId="{3C4A128B-6933-4B54-A176-49B19B4D19B5}" srcId="{24A9F61A-F705-4899-85B6-BE7BEA938049}" destId="{FDDA1B6B-1D57-4249-BFEA-C1F357D8F7DB}" srcOrd="0" destOrd="0" parTransId="{8AD0676E-5553-460D-B309-99833FC441A9}" sibTransId="{35E4DF9E-A722-48D1-ABB0-F242726577EE}"/>
-    <dgm:cxn modelId="{AD11DC8C-3D03-41CF-8DFA-6C34ABC19A52}" type="presOf" srcId="{0520B758-E43F-43DC-8B3F-027FD277C58B}" destId="{6D0C319E-23D6-43F1-B42A-A98526B61A96}" srcOrd="0" destOrd="0" presId="urn:microsoft.com/office/officeart/2005/8/layout/orgChart1"/>
-    <dgm:cxn modelId="{BA797577-CC54-430D-982D-24CEDEAFE85B}" type="presOf" srcId="{1A2BC42C-D917-47BA-9892-2A98BFAD301C}" destId="{D94E57F3-1295-403E-9BE0-48A7FD99AC72}" srcOrd="0" destOrd="0" presId="urn:microsoft.com/office/officeart/2005/8/layout/orgChart1"/>
-    <dgm:cxn modelId="{AF7475BA-5B53-4E11-9F86-DF91C4C12249}" type="presOf" srcId="{2018ECA3-3A50-4106-AD7A-B731246A7598}" destId="{1058AA14-F65C-440C-AFE3-B314A177C29A}" srcOrd="0" destOrd="0" presId="urn:microsoft.com/office/officeart/2005/8/layout/orgChart1"/>
-    <dgm:cxn modelId="{D893047D-9855-4DA6-9FA3-AA77B4095214}" type="presOf" srcId="{7E029FC5-0B45-4201-9BBC-FB6C44F05368}" destId="{562C605B-7DD0-4B03-9063-F50EE92E1CA5}" srcOrd="0" destOrd="0" presId="urn:microsoft.com/office/officeart/2005/8/layout/orgChart1"/>
-    <dgm:cxn modelId="{F96E68CC-2A40-4FB0-BE9A-FBDBC5B9FC3E}" type="presOf" srcId="{3F2A56FE-F1F3-4B58-A8E4-6A6FF3C12065}" destId="{1C0336C7-1C3B-4EC3-A39C-A32229FEE91F}" srcOrd="0" destOrd="0" presId="urn:microsoft.com/office/officeart/2005/8/layout/orgChart1"/>
-    <dgm:cxn modelId="{5020BA93-3DC6-49F5-B2E9-F9F386EB175F}" type="presOf" srcId="{6BEC65C1-B5DA-4EA7-84AF-12402488F2FA}" destId="{2D4163EB-C95A-4803-87E5-AF71E21D9F0A}" srcOrd="1" destOrd="0" presId="urn:microsoft.com/office/officeart/2005/8/layout/orgChart1"/>
-    <dgm:cxn modelId="{04C776B0-ED38-49D3-BD98-FB67A64DF6A6}" type="presOf" srcId="{7DD12802-E74A-4097-86D1-028A7F959A05}" destId="{602B28CD-9751-402D-B38A-9208699B88B9}" srcOrd="0" destOrd="0" presId="urn:microsoft.com/office/officeart/2005/8/layout/orgChart1"/>
-    <dgm:cxn modelId="{DA442048-9214-422A-AD55-B62E4D42569A}" type="presOf" srcId="{DA23096C-C503-4079-9651-0120D7DFD8FB}" destId="{5A4A07DA-DC3F-4FB2-985A-69869BE7034F}" srcOrd="0" destOrd="0" presId="urn:microsoft.com/office/officeart/2005/8/layout/orgChart1"/>
-    <dgm:cxn modelId="{5250407C-D23B-4BD4-A19D-9BD02DCCBB1E}" srcId="{DA23096C-C503-4079-9651-0120D7DFD8FB}" destId="{B4CD55CE-5A64-4000-9BDC-B03F47603D86}" srcOrd="0" destOrd="0" parTransId="{FEA03D8D-E2A3-446C-8872-F4EF7675901C}" sibTransId="{33FCC0AA-CB6D-4F6F-9CCB-872253B5A16B}"/>
-    <dgm:cxn modelId="{BCD3C035-DB26-47F1-8741-A74106EB1162}" type="presOf" srcId="{A0A88FD2-0664-4A56-BE63-946D5533CF07}" destId="{7A49B742-3638-49B3-A71F-D6A49A18C5F1}" srcOrd="0" destOrd="0" presId="urn:microsoft.com/office/officeart/2005/8/layout/orgChart1"/>
-    <dgm:cxn modelId="{F41FAD95-67CD-4EAF-8833-F8E36085A659}" srcId="{5CC81FDE-3B98-4B95-AD39-89E4A4F2D92D}" destId="{B97417FE-BCBA-4F7E-B26B-114EB0A63CDD}" srcOrd="0" destOrd="0" parTransId="{9735FA81-A365-4641-8F21-8EFA2F6CD387}" sibTransId="{DD249135-6B6F-4BDF-91F4-210EB4E24F39}"/>
-    <dgm:cxn modelId="{B422971E-6C3F-44B4-9659-C0B3B6EA0CAA}" type="presOf" srcId="{085AFD13-7F14-47B7-B76D-A7F6AA6D7212}" destId="{46D53ED0-223E-4775-9DAF-03CE5C37E983}" srcOrd="1" destOrd="0" presId="urn:microsoft.com/office/officeart/2005/8/layout/orgChart1"/>
-    <dgm:cxn modelId="{EE970E6C-4262-405F-840E-165E6479255F}" type="presOf" srcId="{35F2F850-E107-4C77-8C9D-F91B243DC4A5}" destId="{F8718B6D-A3A0-4C07-B15E-4D6AA2E80E21}" srcOrd="0" destOrd="0" presId="urn:microsoft.com/office/officeart/2005/8/layout/orgChart1"/>
-    <dgm:cxn modelId="{79C49F6B-DF60-4F7E-876D-8A0CBAA41E74}" type="presOf" srcId="{9D320C81-0A74-4E83-9A78-EDE402268EA2}" destId="{B0AD86AF-D4B7-47AA-A340-27CAC413D1EA}" srcOrd="1" destOrd="0" presId="urn:microsoft.com/office/officeart/2005/8/layout/orgChart1"/>
-    <dgm:cxn modelId="{8A6F1D29-16C7-43E0-8D6C-2B6FD7830F73}" type="presOf" srcId="{8AD0676E-5553-460D-B309-99833FC441A9}" destId="{89A51EBE-9714-4FEA-8270-2B8A9D36AEBA}" srcOrd="0" destOrd="0" presId="urn:microsoft.com/office/officeart/2005/8/layout/orgChart1"/>
-    <dgm:cxn modelId="{BB5A7476-A1FD-41BA-B6AA-A448089510D3}" type="presOf" srcId="{C65A0A47-1744-428E-A2CA-26F846199C1C}" destId="{7E1259E6-9B91-4841-A55A-80511B9ACB54}" srcOrd="1" destOrd="0" presId="urn:microsoft.com/office/officeart/2005/8/layout/orgChart1"/>
-    <dgm:cxn modelId="{AED80F1F-482E-4CA1-9278-9683025FB3D2}" type="presOf" srcId="{2DCF58DD-E3D0-4E43-9D60-E17E6BC34C3E}" destId="{2D2F53EB-A352-4924-8B99-8D078D24C7EA}" srcOrd="0" destOrd="0" presId="urn:microsoft.com/office/officeart/2005/8/layout/orgChart1"/>
-    <dgm:cxn modelId="{322E983C-B738-4DBB-A459-7C48BBB8DD1A}" srcId="{2502981D-B508-4D00-BBE3-C266A648905B}" destId="{BF228FAE-E2F9-4440-A067-75BC2D09439E}" srcOrd="0" destOrd="0" parTransId="{CC19FE3F-C17B-470C-A3B0-EB551EE659BD}" sibTransId="{EBBE59DE-AB61-44BB-9CD9-D5787C473FB3}"/>
-    <dgm:cxn modelId="{D8E6A6F0-779F-461A-99B9-57DA6FB67477}" type="presOf" srcId="{5F27BC77-8941-43F4-8B90-FB3B05823CAC}" destId="{B6F79879-3595-4E55-B58D-6113B02CD8E8}" srcOrd="0" destOrd="0" presId="urn:microsoft.com/office/officeart/2005/8/layout/orgChart1"/>
-    <dgm:cxn modelId="{85206848-C804-4BA3-9671-3125AF0D8244}" type="presOf" srcId="{9F0B79EA-3A30-448C-90A2-15B8E9112023}" destId="{0D2350D7-2FC9-4757-8FB8-DAF4285B6035}" srcOrd="0" destOrd="0" presId="urn:microsoft.com/office/officeart/2005/8/layout/orgChart1"/>
-    <dgm:cxn modelId="{149407FE-0D4A-4984-8362-42F36C850602}" type="presOf" srcId="{9649AF04-732C-4AFA-88F7-8FC2C53116FF}" destId="{D7E127B8-2E5D-4A0F-976B-D3E8043E4C5B}" srcOrd="0" destOrd="0" presId="urn:microsoft.com/office/officeart/2005/8/layout/orgChart1"/>
-    <dgm:cxn modelId="{64D9CC28-AA28-4624-BC4A-204A13F00EB9}" srcId="{2018ECA3-3A50-4106-AD7A-B731246A7598}" destId="{DA23096C-C503-4079-9651-0120D7DFD8FB}" srcOrd="0" destOrd="0" parTransId="{02223512-5C62-4EE0-AA42-DE6D4435D584}" sibTransId="{DCB456B7-4643-43C9-AFCC-5CAF68398CF8}"/>
-    <dgm:cxn modelId="{C31259B2-8F09-4813-8603-127CAC5BA1F4}" type="presOf" srcId="{FEA03D8D-E2A3-446C-8872-F4EF7675901C}" destId="{2635FAE6-A136-440B-94EE-CD567052726F}" srcOrd="0" destOrd="0" presId="urn:microsoft.com/office/officeart/2005/8/layout/orgChart1"/>
-    <dgm:cxn modelId="{631AF3FD-A246-4ECB-83D9-3DDE5E4278B2}" srcId="{DA23096C-C503-4079-9651-0120D7DFD8FB}" destId="{A3D2CFEB-E623-4534-ADF8-DB2132888CFF}" srcOrd="1" destOrd="0" parTransId="{D452F109-5781-45E9-8B00-AF4D270F3020}" sibTransId="{C92DF03B-22AC-423C-814F-36762F5A1B0F}"/>
-    <dgm:cxn modelId="{1A60EF39-94CD-4388-8DF2-838118942B05}" type="presOf" srcId="{A3D2CFEB-E623-4534-ADF8-DB2132888CFF}" destId="{AD606730-8D94-4FAE-84AB-6C0CC4496D5D}" srcOrd="0" destOrd="0" presId="urn:microsoft.com/office/officeart/2005/8/layout/orgChart1"/>
-    <dgm:cxn modelId="{0111E53A-F125-4024-91D8-A2EE082E4AA0}" type="presOf" srcId="{0B361A93-DC8B-43E9-9E58-435B18AFC9B2}" destId="{DC2E5D02-8D5B-489E-92B8-769C86A6A212}" srcOrd="0" destOrd="0" presId="urn:microsoft.com/office/officeart/2005/8/layout/orgChart1"/>
-    <dgm:cxn modelId="{A17DA96F-C559-475C-BE27-FE8646F28698}" type="presOf" srcId="{02223512-5C62-4EE0-AA42-DE6D4435D584}" destId="{6A3AAAAC-3DFF-43F8-8209-3D0095E6D75A}" srcOrd="0" destOrd="0" presId="urn:microsoft.com/office/officeart/2005/8/layout/orgChart1"/>
-    <dgm:cxn modelId="{A637F482-39DD-4470-9BDC-05909EBA9DFB}" srcId="{24A9F61A-F705-4899-85B6-BE7BEA938049}" destId="{238AF202-FC15-4185-BFB0-CA07D2C4F3F9}" srcOrd="2" destOrd="0" parTransId="{91CA89EE-BC4A-4834-B60F-925408B98746}" sibTransId="{A936A088-6ED9-4ED9-BEC6-BF1B1EF5E5DF}"/>
-    <dgm:cxn modelId="{4294F149-73D0-46CD-BEE1-6CDCB66FD098}" srcId="{2502981D-B508-4D00-BBE3-C266A648905B}" destId="{F2A070D0-90DC-4710-9AF5-B06B5662AEA6}" srcOrd="1" destOrd="0" parTransId="{0B361A93-DC8B-43E9-9E58-435B18AFC9B2}" sibTransId="{D9D9AC85-EB10-48A2-BB10-5C819A97DE84}"/>
-    <dgm:cxn modelId="{C2D12244-3239-4E64-9507-0BB88FB63ACD}" type="presOf" srcId="{0520B758-E43F-43DC-8B3F-027FD277C58B}" destId="{83E75304-9D64-4ED0-A8F2-C2AD90D882CF}" srcOrd="1" destOrd="0" presId="urn:microsoft.com/office/officeart/2005/8/layout/orgChart1"/>
-    <dgm:cxn modelId="{6086D401-84F0-4B5E-8CF1-C7140967BB0C}" type="presOf" srcId="{D452F109-5781-45E9-8B00-AF4D270F3020}" destId="{AB95BCF8-91C6-4CC4-9159-EBAB7291A3AA}" srcOrd="0" destOrd="0" presId="urn:microsoft.com/office/officeart/2005/8/layout/orgChart1"/>
-    <dgm:cxn modelId="{41EFF8EB-97BC-4C22-B556-BCA7FF2C3850}" type="presOf" srcId="{DA23096C-C503-4079-9651-0120D7DFD8FB}" destId="{EC93B103-468E-4CBD-B903-F7F643BE1263}" srcOrd="1" destOrd="0" presId="urn:microsoft.com/office/officeart/2005/8/layout/orgChart1"/>
-    <dgm:cxn modelId="{134BF836-08D0-4BBA-8708-D2BD8F59EC06}" type="presOf" srcId="{4B834CAB-818E-4F52-9286-EB6761DDC1AB}" destId="{EDA619DB-9D3D-445F-A1B6-8136A798A345}" srcOrd="0" destOrd="0" presId="urn:microsoft.com/office/officeart/2005/8/layout/orgChart1"/>
-    <dgm:cxn modelId="{201CA1C3-EF9B-4F78-9C4D-E4E53240F309}" srcId="{35F2F850-E107-4C77-8C9D-F91B243DC4A5}" destId="{9649AF04-732C-4AFA-88F7-8FC2C53116FF}" srcOrd="1" destOrd="0" parTransId="{03CB0662-E879-4F8D-8F23-6182AFD1D0F2}" sibTransId="{F8C90F7B-6D0A-4EDA-A38E-9BE775B32392}"/>
-    <dgm:cxn modelId="{C15AB236-BD29-49A2-A73D-E51060745BC9}" type="presOf" srcId="{9F0B79EA-3A30-448C-90A2-15B8E9112023}" destId="{60B23CFF-F02E-4461-AAFB-9778B1658DF2}" srcOrd="1" destOrd="0" presId="urn:microsoft.com/office/officeart/2005/8/layout/orgChart1"/>
-    <dgm:cxn modelId="{8E029C15-A586-49EA-A17C-C1630F12BD28}" type="presOf" srcId="{238AF202-FC15-4185-BFB0-CA07D2C4F3F9}" destId="{3ACE5AC5-CCF3-4813-86F3-CA9684BFDAE6}" srcOrd="1" destOrd="0" presId="urn:microsoft.com/office/officeart/2005/8/layout/orgChart1"/>
-    <dgm:cxn modelId="{E26C256C-E267-469B-A9BD-047053ACA934}" type="presOf" srcId="{B4CD55CE-5A64-4000-9BDC-B03F47603D86}" destId="{5E69BB79-7E02-4BAB-9583-D3921136B6A3}" srcOrd="1" destOrd="0" presId="urn:microsoft.com/office/officeart/2005/8/layout/orgChart1"/>
-    <dgm:cxn modelId="{8A686676-A482-46E6-8351-4D8B74773777}" type="presOf" srcId="{C65A0A47-1744-428E-A2CA-26F846199C1C}" destId="{1575D451-D673-4424-AE4D-AB209AF5EC81}" srcOrd="0" destOrd="0" presId="urn:microsoft.com/office/officeart/2005/8/layout/orgChart1"/>
-    <dgm:cxn modelId="{AC5955BC-4831-4B78-8C2B-13C51ABC9584}" type="presOf" srcId="{CC19FE3F-C17B-470C-A3B0-EB551EE659BD}" destId="{36755ADB-4774-42F4-B5DF-685D738A5BC8}" srcOrd="0" destOrd="0" presId="urn:microsoft.com/office/officeart/2005/8/layout/orgChart1"/>
-    <dgm:cxn modelId="{5D0D2F16-3D63-4AFA-BBFE-4BA6DC8E3AC0}" srcId="{7DD12802-E74A-4097-86D1-028A7F959A05}" destId="{9D320C81-0A74-4E83-9A78-EDE402268EA2}" srcOrd="1" destOrd="0" parTransId="{7E029FC5-0B45-4201-9BBC-FB6C44F05368}" sibTransId="{5B678CCF-84DA-4A15-9790-D90C01312BF4}"/>
-    <dgm:cxn modelId="{1965E8F4-2B4C-4348-95A8-843F71E9A6D9}" type="presOf" srcId="{B97417FE-BCBA-4F7E-B26B-114EB0A63CDD}" destId="{A639485A-B3DE-4FF7-8B8F-86421D00FFBF}" srcOrd="1" destOrd="0" presId="urn:microsoft.com/office/officeart/2005/8/layout/orgChart1"/>
-    <dgm:cxn modelId="{1A14DDAD-8272-4E91-92A2-6FA1021F64E7}" type="presOf" srcId="{A3D2CFEB-E623-4534-ADF8-DB2132888CFF}" destId="{8B5ADAD1-6A48-4917-ACF8-1E93A1E2A654}" srcOrd="1" destOrd="0" presId="urn:microsoft.com/office/officeart/2005/8/layout/orgChart1"/>
     <dgm:cxn modelId="{4A13E5AE-E438-4C26-839C-42D1E720EE6B}" type="presOf" srcId="{FDDA1B6B-1D57-4249-BFEA-C1F357D8F7DB}" destId="{EC5F192A-868D-4E0D-B55E-262045590AED}" srcOrd="1" destOrd="0" presId="urn:microsoft.com/office/officeart/2005/8/layout/orgChart1"/>
-    <dgm:cxn modelId="{5A49ED8D-BCB1-43CA-AC41-9E3FDBD9ABA8}" type="presOf" srcId="{EF96740E-451F-4D50-A83B-D8B9E2184D46}" destId="{7654533E-21FF-4056-AF83-E7A1A3DEF6CD}" srcOrd="0" destOrd="0" presId="urn:microsoft.com/office/officeart/2005/8/layout/orgChart1"/>
-    <dgm:cxn modelId="{4C4C284A-53E7-4DD1-95AD-CA3120C66F92}" srcId="{2018ECA3-3A50-4106-AD7A-B731246A7598}" destId="{7DD12802-E74A-4097-86D1-028A7F959A05}" srcOrd="4" destOrd="0" parTransId="{41CD59CA-F9D8-4CA1-A04F-A4DA4627C1CC}" sibTransId="{9A5C4603-0D36-495A-AAAC-E1D21476B892}"/>
-    <dgm:cxn modelId="{44BFE925-9EB2-4F02-ACB9-851BC9E84561}" type="presOf" srcId="{87C6722B-8411-4627-88ED-F20025A38A56}" destId="{6D4EC7F1-CA82-432F-971D-3C7AA1308BF2}" srcOrd="0" destOrd="0" presId="urn:microsoft.com/office/officeart/2005/8/layout/orgChart1"/>
-    <dgm:cxn modelId="{781C4749-9912-48CE-BD8C-1C77707F3F93}" type="presOf" srcId="{9D320C81-0A74-4E83-9A78-EDE402268EA2}" destId="{CA5B0725-412D-430C-AD19-F662C982586F}" srcOrd="0" destOrd="0" presId="urn:microsoft.com/office/officeart/2005/8/layout/orgChart1"/>
-    <dgm:cxn modelId="{6BFEA5C1-4A14-479A-BFFD-1AB0299BF18C}" type="presOf" srcId="{9649AF04-732C-4AFA-88F7-8FC2C53116FF}" destId="{E1BABCF3-339D-4090-9CAF-29C1BCCD5CF0}" srcOrd="1" destOrd="0" presId="urn:microsoft.com/office/officeart/2005/8/layout/orgChart1"/>
-    <dgm:cxn modelId="{816BE360-888F-4ED7-8E3C-573943B7B966}" type="presOf" srcId="{6BEC65C1-B5DA-4EA7-84AF-12402488F2FA}" destId="{2C4631C8-13A4-470E-8A9B-D904F220465A}" srcOrd="0" destOrd="0" presId="urn:microsoft.com/office/officeart/2005/8/layout/orgChart1"/>
-    <dgm:cxn modelId="{F26DDDEC-41D1-4218-B4B3-80AB5FDE31E2}" type="presOf" srcId="{91CA89EE-BC4A-4834-B60F-925408B98746}" destId="{4013B4B6-4487-4BA1-A2D2-3518FC17178F}" srcOrd="0" destOrd="0" presId="urn:microsoft.com/office/officeart/2005/8/layout/orgChart1"/>
-    <dgm:cxn modelId="{683B6AC8-E0DD-4FA2-9D37-3DCFFF522947}" type="presOf" srcId="{BF228FAE-E2F9-4440-A067-75BC2D09439E}" destId="{70CC56F8-3AC9-46BB-92F2-08916F5123B1}" srcOrd="0" destOrd="0" presId="urn:microsoft.com/office/officeart/2005/8/layout/orgChart1"/>
-    <dgm:cxn modelId="{811DF587-E783-4D60-A76B-ADFBBD7DAC45}" type="presOf" srcId="{270BEE6F-2C56-4827-9E7A-D9E89357073A}" destId="{0936718E-CEEA-4408-9F23-2080F361579F}" srcOrd="0" destOrd="0" presId="urn:microsoft.com/office/officeart/2005/8/layout/orgChart1"/>
-    <dgm:cxn modelId="{ABAFE405-3BAE-44CB-B26C-08ADD18C51D1}" type="presOf" srcId="{5CC81FDE-3B98-4B95-AD39-89E4A4F2D92D}" destId="{723EDBF7-BB25-40A8-9D84-FEC8BF62B464}" srcOrd="0" destOrd="0" presId="urn:microsoft.com/office/officeart/2005/8/layout/orgChart1"/>
-    <dgm:cxn modelId="{BC3ABDA0-DE97-4DB0-A6E3-90C4F49BADE3}" srcId="{2018ECA3-3A50-4106-AD7A-B731246A7598}" destId="{5CC81FDE-3B98-4B95-AD39-89E4A4F2D92D}" srcOrd="3" destOrd="0" parTransId="{4B834CAB-818E-4F52-9286-EB6761DDC1AB}" sibTransId="{AC3861EB-AEC7-4851-A42D-4D3CC2A6AA7B}"/>
-    <dgm:cxn modelId="{F3A46E32-D761-40C2-B0EA-7291D6D35642}" srcId="{7DD12802-E74A-4097-86D1-028A7F959A05}" destId="{1A2BC42C-D917-47BA-9892-2A98BFAD301C}" srcOrd="0" destOrd="0" parTransId="{3F2A56FE-F1F3-4B58-A8E4-6A6FF3C12065}" sibTransId="{DEB770E0-3D0E-45A5-95A4-5D65E42BA39F}"/>
-    <dgm:cxn modelId="{3A4FC1B0-FDCF-4494-B985-EA64C297FB80}" type="presOf" srcId="{B8722430-E04D-4FFD-BB4C-E90C8E6E9917}" destId="{8574B1D5-AB4E-4EA2-9BE4-CF4DA634B87C}" srcOrd="0" destOrd="0" presId="urn:microsoft.com/office/officeart/2005/8/layout/orgChart1"/>
-    <dgm:cxn modelId="{F267F84B-1FA7-4E62-ABEC-812E311D6414}" type="presOf" srcId="{F2A070D0-90DC-4710-9AF5-B06B5662AEA6}" destId="{002116D8-3FBF-45CD-850E-4D9F16A63BA2}" srcOrd="1" destOrd="0" presId="urn:microsoft.com/office/officeart/2005/8/layout/orgChart1"/>
-    <dgm:cxn modelId="{04C6CE32-EFD4-434F-8571-B87BE2ACB9CE}" type="presOf" srcId="{2502981D-B508-4D00-BBE3-C266A648905B}" destId="{1B1CDD48-3727-404A-A7F2-A7C163EFA9B4}" srcOrd="1" destOrd="0" presId="urn:microsoft.com/office/officeart/2005/8/layout/orgChart1"/>
-    <dgm:cxn modelId="{22AB0ACE-4294-414B-AAAF-798103133538}" type="presOf" srcId="{5EEA19EC-82E6-48A6-A9DF-5998351B73D7}" destId="{74337026-54A3-416F-BF29-2F2933D2B907}" srcOrd="0" destOrd="0" presId="urn:microsoft.com/office/officeart/2005/8/layout/orgChart1"/>
-    <dgm:cxn modelId="{B9A1AC47-1563-4EA2-8C6A-1AF6AD3C9D0A}" srcId="{24A9F61A-F705-4899-85B6-BE7BEA938049}" destId="{270BEE6F-2C56-4827-9E7A-D9E89357073A}" srcOrd="1" destOrd="0" parTransId="{EF96740E-451F-4D50-A83B-D8B9E2184D46}" sibTransId="{D0ACCEE7-795C-46DE-90E9-F964D1CD0259}"/>
-    <dgm:cxn modelId="{EA6C5C9C-8093-43A5-A7DA-FB0BB57EF203}" type="presOf" srcId="{238AF202-FC15-4185-BFB0-CA07D2C4F3F9}" destId="{233E93EC-7755-4700-ABEF-527A5EB0BB0A}" srcOrd="0" destOrd="0" presId="urn:microsoft.com/office/officeart/2005/8/layout/orgChart1"/>
-    <dgm:cxn modelId="{A1938B66-2A80-453F-ADE4-A9CC9A3FF95E}" type="presOf" srcId="{7DD12802-E74A-4097-86D1-028A7F959A05}" destId="{E979CEFB-882A-43F6-B0D1-C6E4CD22FE8F}" srcOrd="1" destOrd="0" presId="urn:microsoft.com/office/officeart/2005/8/layout/orgChart1"/>
-    <dgm:cxn modelId="{93A07223-F3F9-4728-84D4-3A5000F40DF5}" type="presOf" srcId="{B97417FE-BCBA-4F7E-B26B-114EB0A63CDD}" destId="{E33D8E8D-3F33-46DC-8C84-D1C71321D732}" srcOrd="0" destOrd="0" presId="urn:microsoft.com/office/officeart/2005/8/layout/orgChart1"/>
-    <dgm:cxn modelId="{8BCF3E7F-79F0-4840-9382-6490B5D65E69}" type="presOf" srcId="{2018ECA3-3A50-4106-AD7A-B731246A7598}" destId="{EDB2F9E9-0BB0-4A14-AE78-9ADE0DB7D7F9}" srcOrd="1" destOrd="0" presId="urn:microsoft.com/office/officeart/2005/8/layout/orgChart1"/>
-    <dgm:cxn modelId="{2730FB3B-C3E9-452C-BCD4-3233C566F903}" type="presOf" srcId="{9735FA81-A365-4641-8F21-8EFA2F6CD387}" destId="{794C1402-FE47-41F6-A06E-0AB094AACC3A}" srcOrd="0" destOrd="0" presId="urn:microsoft.com/office/officeart/2005/8/layout/orgChart1"/>
-    <dgm:cxn modelId="{EF1CE36C-EBD8-4F94-8000-6B950C11FC85}" type="presOf" srcId="{71383C8E-BA2F-4107-B6C7-08C92C51E575}" destId="{394E97AD-5282-4D3C-851B-1739E18C3B22}" srcOrd="0" destOrd="0" presId="urn:microsoft.com/office/officeart/2005/8/layout/orgChart1"/>
-    <dgm:cxn modelId="{F045FD77-7054-4416-8E9F-6738C4D97703}" srcId="{9F0B79EA-3A30-448C-90A2-15B8E9112023}" destId="{C65A0A47-1744-428E-A2CA-26F846199C1C}" srcOrd="0" destOrd="0" parTransId="{B8722430-E04D-4FFD-BB4C-E90C8E6E9917}" sibTransId="{3AD53FA2-8DD5-4575-B835-08ED8439DE16}"/>
-    <dgm:cxn modelId="{7ED9A2EB-562E-4BDE-81B6-73AE8DEF1990}" srcId="{2018ECA3-3A50-4106-AD7A-B731246A7598}" destId="{0520B758-E43F-43DC-8B3F-027FD277C58B}" srcOrd="2" destOrd="0" parTransId="{1199739B-BFE7-4EDE-9E9F-B924D03D7AC9}" sibTransId="{F5747C06-BE1D-44A1-B345-4736545CF320}"/>
     <dgm:cxn modelId="{8BA7F1FC-B535-41C5-8E23-56B7A99CFB83}" type="presParOf" srcId="{B6F79879-3595-4E55-B58D-6113B02CD8E8}" destId="{FCE71EAA-F8EC-40CF-9D77-F1FDDFE717C9}" srcOrd="0" destOrd="0" presId="urn:microsoft.com/office/officeart/2005/8/layout/orgChart1"/>
     <dgm:cxn modelId="{2D19A12D-D30B-474C-B3E9-7A0A0AB146D3}" type="presParOf" srcId="{FCE71EAA-F8EC-40CF-9D77-F1FDDFE717C9}" destId="{0D6618B1-04B1-4C24-9063-86D18392EB01}" srcOrd="0" destOrd="0" presId="urn:microsoft.com/office/officeart/2005/8/layout/orgChart1"/>
     <dgm:cxn modelId="{ADF9F516-DD4D-469D-A2ED-77973A833611}" type="presParOf" srcId="{0D6618B1-04B1-4C24-9063-86D18392EB01}" destId="{1058AA14-F65C-440C-AFE3-B314A177C29A}" srcOrd="0" destOrd="0" presId="urn:microsoft.com/office/officeart/2005/8/layout/orgChart1"/>
@@ -4808,7 +4844,7 @@
           </a:pPr>
           <a:r>
             <a:rPr lang="de-DE" sz="1500" kern="1200" dirty="0" smtClean="0"/>
-            <a:t>Management</a:t>
+            <a:t>1. Management</a:t>
           </a:r>
           <a:endParaRPr lang="de-DE" sz="1500" kern="1200" dirty="0"/>
         </a:p>
@@ -4886,7 +4922,7 @@
           </a:pPr>
           <a:r>
             <a:rPr lang="de-DE" sz="1500" kern="1200" dirty="0" smtClean="0"/>
-            <a:t>Planung</a:t>
+            <a:t>1.1 Planung</a:t>
           </a:r>
           <a:endParaRPr lang="de-DE" sz="1500" kern="1200" dirty="0"/>
         </a:p>
@@ -4964,7 +5000,7 @@
           </a:pPr>
           <a:r>
             <a:rPr lang="de-DE" sz="1500" kern="1200" dirty="0" smtClean="0"/>
-            <a:t>Kontrolle</a:t>
+            <a:t>1.2 Kontrolle</a:t>
           </a:r>
           <a:endParaRPr lang="de-DE" sz="1500" kern="1200" dirty="0"/>
         </a:p>
@@ -5042,7 +5078,7 @@
           </a:pPr>
           <a:r>
             <a:rPr lang="de-DE" sz="1500" kern="1200" dirty="0" smtClean="0"/>
-            <a:t>Anforderungen</a:t>
+            <a:t>2. Anforderungen</a:t>
           </a:r>
           <a:endParaRPr lang="de-DE" sz="1500" kern="1200" dirty="0"/>
         </a:p>
@@ -5120,7 +5156,7 @@
           </a:pPr>
           <a:r>
             <a:rPr lang="de-DE" sz="1500" kern="1200" dirty="0" smtClean="0"/>
-            <a:t>Dokumentation</a:t>
+            <a:t>2.1 Dokumentation</a:t>
           </a:r>
           <a:endParaRPr lang="de-DE" sz="1500" kern="1200" dirty="0"/>
         </a:p>
@@ -5198,7 +5234,7 @@
           </a:pPr>
           <a:r>
             <a:rPr lang="de-DE" sz="1500" kern="1200" dirty="0" smtClean="0"/>
-            <a:t>App</a:t>
+            <a:t>2.2 App</a:t>
           </a:r>
           <a:endParaRPr lang="de-DE" sz="1500" kern="1200" dirty="0"/>
         </a:p>
@@ -5276,7 +5312,7 @@
           </a:pPr>
           <a:r>
             <a:rPr lang="de-DE" sz="1500" kern="1200" dirty="0" smtClean="0"/>
-            <a:t>GPS</a:t>
+            <a:t>2.2.1 GPS</a:t>
           </a:r>
           <a:endParaRPr lang="de-DE" sz="1500" kern="1200" dirty="0"/>
         </a:p>
@@ -5354,7 +5390,7 @@
           </a:pPr>
           <a:r>
             <a:rPr lang="de-DE" sz="1500" kern="1200" dirty="0" smtClean="0"/>
-            <a:t>Inhalt</a:t>
+            <a:t>2.2.1 Inhalt</a:t>
           </a:r>
           <a:endParaRPr lang="de-DE" sz="1500" kern="1200" dirty="0"/>
         </a:p>
@@ -5432,7 +5468,7 @@
           </a:pPr>
           <a:r>
             <a:rPr lang="de-DE" sz="1500" kern="1200" dirty="0" smtClean="0"/>
-            <a:t>Entwicklung</a:t>
+            <a:t>3. Entwicklung</a:t>
           </a:r>
           <a:endParaRPr lang="de-DE" sz="1500" kern="1200" dirty="0"/>
         </a:p>
@@ -5510,7 +5546,7 @@
           </a:pPr>
           <a:r>
             <a:rPr lang="de-DE" sz="1500" kern="1200" dirty="0" smtClean="0"/>
-            <a:t>App</a:t>
+            <a:t>3.1 App</a:t>
           </a:r>
           <a:endParaRPr lang="de-DE" sz="1500" kern="1200" dirty="0"/>
         </a:p>
@@ -5588,7 +5624,11 @@
           </a:pPr>
           <a:r>
             <a:rPr lang="de-DE" sz="1500" kern="1200" dirty="0" smtClean="0"/>
-            <a:t>API Verwendung</a:t>
+            <a:t>3.1.1 API </a:t>
+          </a:r>
+          <a:r>
+            <a:rPr lang="de-DE" sz="1500" kern="1200" dirty="0" smtClean="0"/>
+            <a:t>Verwendung</a:t>
           </a:r>
           <a:endParaRPr lang="de-DE" sz="1500" kern="1200" dirty="0"/>
         </a:p>
@@ -5666,7 +5706,7 @@
           </a:pPr>
           <a:r>
             <a:rPr lang="de-DE" sz="1500" kern="1200" dirty="0" smtClean="0"/>
-            <a:t>GUI</a:t>
+            <a:t>3.1.2 GUI</a:t>
           </a:r>
           <a:endParaRPr lang="de-DE" sz="1500" kern="1200" dirty="0"/>
         </a:p>
@@ -5744,7 +5784,11 @@
           </a:pPr>
           <a:r>
             <a:rPr lang="de-DE" sz="1500" kern="1200" dirty="0" smtClean="0"/>
-            <a:t>Standort erfassen</a:t>
+            <a:t>3.1.3 Standort </a:t>
+          </a:r>
+          <a:r>
+            <a:rPr lang="de-DE" sz="1500" kern="1200" dirty="0" smtClean="0"/>
+            <a:t>erfassen</a:t>
           </a:r>
           <a:endParaRPr lang="de-DE" sz="1500" kern="1200" dirty="0"/>
         </a:p>
@@ -5822,7 +5866,7 @@
           </a:pPr>
           <a:r>
             <a:rPr lang="de-DE" sz="1500" kern="1200" dirty="0" smtClean="0"/>
-            <a:t>Inhalte</a:t>
+            <a:t>3.2 Inhalte</a:t>
           </a:r>
           <a:endParaRPr lang="de-DE" sz="1500" kern="1200" dirty="0"/>
         </a:p>
@@ -5900,7 +5944,7 @@
           </a:pPr>
           <a:r>
             <a:rPr lang="de-DE" sz="1500" kern="1200" dirty="0" smtClean="0"/>
-            <a:t>Bereitstellen</a:t>
+            <a:t>3.2.1 Bereitstellen</a:t>
           </a:r>
           <a:endParaRPr lang="de-DE" sz="1500" kern="1200" dirty="0"/>
         </a:p>
@@ -5978,7 +6022,7 @@
           </a:pPr>
           <a:r>
             <a:rPr lang="de-DE" sz="1500" kern="1200" dirty="0" smtClean="0"/>
-            <a:t>Route</a:t>
+            <a:t>3.2.2 Route</a:t>
           </a:r>
           <a:endParaRPr lang="de-DE" sz="1500" kern="1200" dirty="0"/>
         </a:p>
@@ -6056,7 +6100,7 @@
           </a:pPr>
           <a:r>
             <a:rPr lang="de-DE" sz="1500" kern="1200" dirty="0" smtClean="0"/>
-            <a:t>Tests</a:t>
+            <a:t>4. Tests</a:t>
           </a:r>
           <a:endParaRPr lang="de-DE" sz="1500" kern="1200" dirty="0"/>
         </a:p>
@@ -6134,7 +6178,7 @@
           </a:pPr>
           <a:r>
             <a:rPr lang="de-DE" sz="1500" kern="1200" dirty="0" smtClean="0"/>
-            <a:t>Software</a:t>
+            <a:t>4.1 Software</a:t>
           </a:r>
           <a:endParaRPr lang="de-DE" sz="1500" kern="1200" dirty="0"/>
         </a:p>
@@ -6212,7 +6256,7 @@
           </a:pPr>
           <a:r>
             <a:rPr lang="de-DE" sz="1500" kern="1200" dirty="0" smtClean="0"/>
-            <a:t>Touren</a:t>
+            <a:t>4.2 Touren</a:t>
           </a:r>
           <a:endParaRPr lang="de-DE" sz="1500" kern="1200" dirty="0"/>
         </a:p>
@@ -6290,7 +6334,7 @@
           </a:pPr>
           <a:r>
             <a:rPr lang="de-DE" sz="1500" kern="1200" dirty="0" smtClean="0"/>
-            <a:t>Release</a:t>
+            <a:t>5. Release</a:t>
           </a:r>
           <a:endParaRPr lang="de-DE" sz="1500" kern="1200" dirty="0"/>
         </a:p>
@@ -6368,7 +6412,7 @@
           </a:pPr>
           <a:r>
             <a:rPr lang="de-DE" sz="1500" kern="1200" dirty="0" smtClean="0"/>
-            <a:t>Übergabe</a:t>
+            <a:t>5.1 Übergabe</a:t>
           </a:r>
           <a:endParaRPr lang="de-DE" sz="1500" kern="1200" dirty="0"/>
         </a:p>
@@ -6446,7 +6490,7 @@
           </a:pPr>
           <a:r>
             <a:rPr lang="de-DE" sz="1500" kern="1200" dirty="0" smtClean="0"/>
-            <a:t>Veröffentlichung</a:t>
+            <a:t>5.2 Veröffentlichung</a:t>
           </a:r>
           <a:endParaRPr lang="de-DE" sz="1500" kern="1200" dirty="0"/>
         </a:p>
@@ -11507,7 +11551,7 @@
             <p:ph idx="1"/>
             <p:extLst>
               <p:ext uri="{D42A27DB-BD31-4B8C-83A1-F6EECF244321}">
-                <p14:modId xmlns:p14="http://schemas.microsoft.com/office/powerpoint/2010/main" val="1860130583"/>
+                <p14:modId xmlns:p14="http://schemas.microsoft.com/office/powerpoint/2010/main" val="1698247640"/>
               </p:ext>
             </p:extLst>
           </p:nvPr>

</xml_diff>